<commit_message>
lots of edits to powerpoints before studio session.
</commit_message>
<xml_diff>
--- a/week_1/1.1 - 1.5 Intro to Python.pptx
+++ b/week_1/1.1 - 1.5 Intro to Python.pptx
@@ -223,7 +223,7 @@
           <a:p>
             <a:fld id="{2B1A9BC7-5E19-CB4B-B22A-915B012DE73A}" type="datetimeFigureOut">
               <a:rPr lang="en-US" smtClean="0"/>
-              <a:t>9/20/15</a:t>
+              <a:t>9/28/15</a:t>
             </a:fld>
             <a:endParaRPr lang="en-US"/>
           </a:p>
@@ -1097,7 +1097,7 @@
           <a:p>
             <a:fld id="{145C530C-477C-194C-8B92-CA968C2BDAE6}" type="datetimeFigureOut">
               <a:rPr lang="en-US" smtClean="0"/>
-              <a:t>9/20/15</a:t>
+              <a:t>9/28/15</a:t>
             </a:fld>
             <a:endParaRPr lang="en-US"/>
           </a:p>
@@ -1267,7 +1267,7 @@
           <a:p>
             <a:fld id="{145C530C-477C-194C-8B92-CA968C2BDAE6}" type="datetimeFigureOut">
               <a:rPr lang="en-US" smtClean="0"/>
-              <a:t>9/20/15</a:t>
+              <a:t>9/28/15</a:t>
             </a:fld>
             <a:endParaRPr lang="en-US"/>
           </a:p>
@@ -1447,7 +1447,7 @@
           <a:p>
             <a:fld id="{145C530C-477C-194C-8B92-CA968C2BDAE6}" type="datetimeFigureOut">
               <a:rPr lang="en-US" smtClean="0"/>
-              <a:t>9/20/15</a:t>
+              <a:t>9/28/15</a:t>
             </a:fld>
             <a:endParaRPr lang="en-US"/>
           </a:p>
@@ -1617,7 +1617,7 @@
           <a:p>
             <a:fld id="{145C530C-477C-194C-8B92-CA968C2BDAE6}" type="datetimeFigureOut">
               <a:rPr lang="en-US" smtClean="0"/>
-              <a:t>9/20/15</a:t>
+              <a:t>9/28/15</a:t>
             </a:fld>
             <a:endParaRPr lang="en-US"/>
           </a:p>
@@ -1863,7 +1863,7 @@
           <a:p>
             <a:fld id="{145C530C-477C-194C-8B92-CA968C2BDAE6}" type="datetimeFigureOut">
               <a:rPr lang="en-US" smtClean="0"/>
-              <a:t>9/20/15</a:t>
+              <a:t>9/28/15</a:t>
             </a:fld>
             <a:endParaRPr lang="en-US"/>
           </a:p>
@@ -2151,7 +2151,7 @@
           <a:p>
             <a:fld id="{145C530C-477C-194C-8B92-CA968C2BDAE6}" type="datetimeFigureOut">
               <a:rPr lang="en-US" smtClean="0"/>
-              <a:t>9/20/15</a:t>
+              <a:t>9/28/15</a:t>
             </a:fld>
             <a:endParaRPr lang="en-US"/>
           </a:p>
@@ -2573,7 +2573,7 @@
           <a:p>
             <a:fld id="{145C530C-477C-194C-8B92-CA968C2BDAE6}" type="datetimeFigureOut">
               <a:rPr lang="en-US" smtClean="0"/>
-              <a:t>9/20/15</a:t>
+              <a:t>9/28/15</a:t>
             </a:fld>
             <a:endParaRPr lang="en-US"/>
           </a:p>
@@ -2691,7 +2691,7 @@
           <a:p>
             <a:fld id="{145C530C-477C-194C-8B92-CA968C2BDAE6}" type="datetimeFigureOut">
               <a:rPr lang="en-US" smtClean="0"/>
-              <a:t>9/20/15</a:t>
+              <a:t>9/28/15</a:t>
             </a:fld>
             <a:endParaRPr lang="en-US"/>
           </a:p>
@@ -2786,7 +2786,7 @@
           <a:p>
             <a:fld id="{145C530C-477C-194C-8B92-CA968C2BDAE6}" type="datetimeFigureOut">
               <a:rPr lang="en-US" smtClean="0"/>
-              <a:t>9/20/15</a:t>
+              <a:t>9/28/15</a:t>
             </a:fld>
             <a:endParaRPr lang="en-US"/>
           </a:p>
@@ -3063,7 +3063,7 @@
           <a:p>
             <a:fld id="{145C530C-477C-194C-8B92-CA968C2BDAE6}" type="datetimeFigureOut">
               <a:rPr lang="en-US" smtClean="0"/>
-              <a:t>9/20/15</a:t>
+              <a:t>9/28/15</a:t>
             </a:fld>
             <a:endParaRPr lang="en-US"/>
           </a:p>
@@ -3316,7 +3316,7 @@
           <a:p>
             <a:fld id="{145C530C-477C-194C-8B92-CA968C2BDAE6}" type="datetimeFigureOut">
               <a:rPr lang="en-US" smtClean="0"/>
-              <a:t>9/20/15</a:t>
+              <a:t>9/28/15</a:t>
             </a:fld>
             <a:endParaRPr lang="en-US"/>
           </a:p>
@@ -3529,7 +3529,7 @@
           <a:p>
             <a:fld id="{145C530C-477C-194C-8B92-CA968C2BDAE6}" type="datetimeFigureOut">
               <a:rPr lang="en-US" smtClean="0"/>
-              <a:t>9/20/15</a:t>
+              <a:t>9/28/15</a:t>
             </a:fld>
             <a:endParaRPr lang="en-US"/>
           </a:p>
@@ -3971,6 +3971,13 @@
   <p:clrMapOvr>
     <a:masterClrMapping/>
   </p:clrMapOvr>
+  <p:timing>
+    <p:tnLst>
+      <p:par>
+        <p:cTn xmlns:p14="http://schemas.microsoft.com/office/powerpoint/2010/main" id="1" dur="indefinite" restart="never" nodeType="tmRoot"/>
+      </p:par>
+    </p:tnLst>
+  </p:timing>
 </p:sld>
 </file>
 
@@ -6065,6 +6072,13 @@
   <p:clrMapOvr>
     <a:masterClrMapping/>
   </p:clrMapOvr>
+  <p:timing>
+    <p:tnLst>
+      <p:par>
+        <p:cTn xmlns:p14="http://schemas.microsoft.com/office/powerpoint/2010/main" id="1" dur="indefinite" restart="never" nodeType="tmRoot"/>
+      </p:par>
+    </p:tnLst>
+  </p:timing>
 </p:sld>
 </file>
 
@@ -8142,15 +8156,7 @@
           <a:p>
             <a:r>
               <a:rPr lang="en-US" dirty="0" smtClean="0"/>
-              <a:t>It’s very </a:t>
-            </a:r>
-            <a:r>
-              <a:rPr lang="en-US" dirty="0" smtClean="0"/>
-              <a:t>verbose.  </a:t>
-            </a:r>
-            <a:r>
-              <a:rPr lang="en-US" dirty="0" smtClean="0"/>
-              <a:t>You have to </a:t>
+              <a:t>It’s very verbose.  You have to </a:t>
             </a:r>
             <a:r>
               <a:rPr lang="en-US" dirty="0" err="1" smtClean="0"/>
@@ -9421,6 +9427,13 @@
   <p:clrMapOvr>
     <a:masterClrMapping/>
   </p:clrMapOvr>
+  <p:timing>
+    <p:tnLst>
+      <p:par>
+        <p:cTn xmlns:p14="http://schemas.microsoft.com/office/powerpoint/2010/main" id="1" dur="indefinite" restart="never" nodeType="tmRoot"/>
+      </p:par>
+    </p:tnLst>
+  </p:timing>
 </p:sld>
 </file>
 
@@ -9697,13 +9710,8 @@
           <a:p>
             <a:r>
               <a:rPr lang="en-US" dirty="0" smtClean="0"/>
-              <a:t>The answer if ultimately </a:t>
-            </a:r>
-            <a:r>
-              <a:rPr lang="en-US" dirty="0" smtClean="0"/>
-              <a:t>unclear Python and R both have their strengths and weaknesses</a:t>
-            </a:r>
-            <a:endParaRPr lang="en-US" dirty="0" smtClean="0"/>
+              <a:t>The answer if ultimately unclear Python and R both have their strengths and weaknesses</a:t>
+            </a:r>
           </a:p>
           <a:p>
             <a:pPr lvl="1"/>
@@ -10035,6 +10043,13 @@
   <p:clrMapOvr>
     <a:masterClrMapping/>
   </p:clrMapOvr>
+  <p:timing>
+    <p:tnLst>
+      <p:par>
+        <p:cTn xmlns:p14="http://schemas.microsoft.com/office/powerpoint/2010/main" id="1" dur="indefinite" restart="never" nodeType="tmRoot"/>
+      </p:par>
+    </p:tnLst>
+  </p:timing>
 </p:sld>
 </file>
 
@@ -10155,6 +10170,13 @@
   <p:clrMapOvr>
     <a:masterClrMapping/>
   </p:clrMapOvr>
+  <p:timing>
+    <p:tnLst>
+      <p:par>
+        <p:cTn xmlns:p14="http://schemas.microsoft.com/office/powerpoint/2010/main" id="1" dur="indefinite" restart="never" nodeType="tmRoot"/>
+      </p:par>
+    </p:tnLst>
+  </p:timing>
 </p:sld>
 </file>
 
@@ -10303,6 +10325,13 @@
   <p:clrMapOvr>
     <a:masterClrMapping/>
   </p:clrMapOvr>
+  <p:timing>
+    <p:tnLst>
+      <p:par>
+        <p:cTn xmlns:p14="http://schemas.microsoft.com/office/powerpoint/2010/main" id="1" dur="indefinite" restart="never" nodeType="tmRoot"/>
+      </p:par>
+    </p:tnLst>
+  </p:timing>
 </p:sld>
 </file>
 
@@ -10426,8 +10455,13 @@
             <a:pPr lvl="1"/>
             <a:r>
               <a:rPr lang="en-US" dirty="0" smtClean="0"/>
-              <a:t>We’ll start learning the exact meaning of these statements soon.</a:t>
-            </a:r>
+              <a:t>As we learn to program, we’ll learn the exact meaning of these statement and how to </a:t>
+            </a:r>
+            <a:r>
+              <a:rPr lang="en-US" smtClean="0"/>
+              <a:t>construct them.</a:t>
+            </a:r>
+            <a:endParaRPr lang="en-US" dirty="0" smtClean="0"/>
           </a:p>
           <a:p>
             <a:pPr marL="457200" lvl="1" indent="0">
@@ -10447,6 +10481,13 @@
   <p:clrMapOvr>
     <a:masterClrMapping/>
   </p:clrMapOvr>
+  <p:timing>
+    <p:tnLst>
+      <p:par>
+        <p:cTn xmlns:p14="http://schemas.microsoft.com/office/powerpoint/2010/main" id="1" dur="indefinite" restart="never" nodeType="tmRoot"/>
+      </p:par>
+    </p:tnLst>
+  </p:timing>
 </p:sld>
 </file>
 
@@ -10519,6 +10560,13 @@
   <p:clrMapOvr>
     <a:masterClrMapping/>
   </p:clrMapOvr>
+  <p:timing>
+    <p:tnLst>
+      <p:par>
+        <p:cTn xmlns:p14="http://schemas.microsoft.com/office/powerpoint/2010/main" id="1" dur="indefinite" restart="never" nodeType="tmRoot"/>
+      </p:par>
+    </p:tnLst>
+  </p:timing>
 </p:sld>
 </file>
 
@@ -10842,6 +10890,13 @@
   <p:clrMapOvr>
     <a:masterClrMapping/>
   </p:clrMapOvr>
+  <p:timing>
+    <p:tnLst>
+      <p:par>
+        <p:cTn xmlns:p14="http://schemas.microsoft.com/office/powerpoint/2010/main" id="1" dur="indefinite" restart="never" nodeType="tmRoot"/>
+      </p:par>
+    </p:tnLst>
+  </p:timing>
 </p:sld>
 </file>
 

</xml_diff>